<commit_message>
Added remark on excess package usage
</commit_message>
<xml_diff>
--- a/R/Conda/conda.pptx
+++ b/R/Conda/conda.pptx
@@ -208,7 +208,7 @@
           <a:p>
             <a:fld id="{A75423B0-5559-4471-962E-44A27D80B424}" type="datetimeFigureOut">
               <a:rPr lang="nl-BE" smtClean="0"/>
-              <a:t>2016-01-11</a:t>
+              <a:t>2016-01-13</a:t>
             </a:fld>
             <a:endParaRPr lang="nl-BE"/>
           </a:p>
@@ -691,7 +691,7 @@
           <a:p>
             <a:fld id="{686FA373-BD9C-4E91-93F7-D33713AC9EC2}" type="datetime1">
               <a:rPr lang="nl-BE" smtClean="0"/>
-              <a:t>2016-01-11</a:t>
+              <a:t>2016-01-13</a:t>
             </a:fld>
             <a:endParaRPr lang="nl-BE"/>
           </a:p>
@@ -861,7 +861,7 @@
           <a:p>
             <a:fld id="{4DF2C210-D48F-4B06-BACE-3B126E0EBD8A}" type="datetime1">
               <a:rPr lang="nl-BE" smtClean="0"/>
-              <a:t>2016-01-11</a:t>
+              <a:t>2016-01-13</a:t>
             </a:fld>
             <a:endParaRPr lang="nl-BE"/>
           </a:p>
@@ -1041,7 +1041,7 @@
           <a:p>
             <a:fld id="{2A1C394C-E082-46E5-A29C-2B3E42C8C1B9}" type="datetime1">
               <a:rPr lang="nl-BE" smtClean="0"/>
-              <a:t>2016-01-11</a:t>
+              <a:t>2016-01-13</a:t>
             </a:fld>
             <a:endParaRPr lang="nl-BE"/>
           </a:p>
@@ -1211,7 +1211,7 @@
           <a:p>
             <a:fld id="{9DA0CB6E-F841-4348-835A-DFE7DEADFAB2}" type="datetime1">
               <a:rPr lang="nl-BE" smtClean="0"/>
-              <a:t>2016-01-11</a:t>
+              <a:t>2016-01-13</a:t>
             </a:fld>
             <a:endParaRPr lang="nl-BE"/>
           </a:p>
@@ -1455,7 +1455,7 @@
           <a:p>
             <a:fld id="{D72DEE7C-0189-434D-B689-ACD9BB284BB2}" type="datetime1">
               <a:rPr lang="nl-BE" smtClean="0"/>
-              <a:t>2016-01-11</a:t>
+              <a:t>2016-01-13</a:t>
             </a:fld>
             <a:endParaRPr lang="nl-BE"/>
           </a:p>
@@ -1687,7 +1687,7 @@
           <a:p>
             <a:fld id="{79D5BFDE-F220-49E4-A982-A73A2656829B}" type="datetime1">
               <a:rPr lang="nl-BE" smtClean="0"/>
-              <a:t>2016-01-11</a:t>
+              <a:t>2016-01-13</a:t>
             </a:fld>
             <a:endParaRPr lang="nl-BE"/>
           </a:p>
@@ -2054,7 +2054,7 @@
           <a:p>
             <a:fld id="{B586F026-0425-415D-BC1C-9DD54C5BE30C}" type="datetime1">
               <a:rPr lang="nl-BE" smtClean="0"/>
-              <a:t>2016-01-11</a:t>
+              <a:t>2016-01-13</a:t>
             </a:fld>
             <a:endParaRPr lang="nl-BE"/>
           </a:p>
@@ -2172,7 +2172,7 @@
           <a:p>
             <a:fld id="{909B9ED4-0FB0-4E91-9713-CF8AFB422703}" type="datetime1">
               <a:rPr lang="nl-BE" smtClean="0"/>
-              <a:t>2016-01-11</a:t>
+              <a:t>2016-01-13</a:t>
             </a:fld>
             <a:endParaRPr lang="nl-BE"/>
           </a:p>
@@ -2267,7 +2267,7 @@
           <a:p>
             <a:fld id="{C362DD12-1484-42BC-AC34-54C77652C51D}" type="datetime1">
               <a:rPr lang="nl-BE" smtClean="0"/>
-              <a:t>2016-01-11</a:t>
+              <a:t>2016-01-13</a:t>
             </a:fld>
             <a:endParaRPr lang="nl-BE"/>
           </a:p>
@@ -2544,7 +2544,7 @@
           <a:p>
             <a:fld id="{2D287371-76E5-493E-8E6D-41AE773DECA9}" type="datetime1">
               <a:rPr lang="nl-BE" smtClean="0"/>
-              <a:t>2016-01-11</a:t>
+              <a:t>2016-01-13</a:t>
             </a:fld>
             <a:endParaRPr lang="nl-BE"/>
           </a:p>
@@ -2801,7 +2801,7 @@
           <a:p>
             <a:fld id="{B1E0782B-8E35-4BFF-A594-A2C221F4E786}" type="datetime1">
               <a:rPr lang="nl-BE" smtClean="0"/>
-              <a:t>2016-01-11</a:t>
+              <a:t>2016-01-13</a:t>
             </a:fld>
             <a:endParaRPr lang="nl-BE"/>
           </a:p>
@@ -3014,7 +3014,7 @@
           <a:p>
             <a:fld id="{121B80C9-C09F-4ACE-B296-5791D63C3E98}" type="datetime1">
               <a:rPr lang="nl-BE" smtClean="0"/>
-              <a:t>2016-01-11</a:t>
+              <a:t>2016-01-13</a:t>
             </a:fld>
             <a:endParaRPr lang="nl-BE"/>
           </a:p>
@@ -4645,7 +4645,9 @@
         </p:nvSpPr>
         <p:spPr/>
         <p:txBody>
-          <a:bodyPr/>
+          <a:bodyPr>
+            <a:normAutofit lnSpcReduction="10000"/>
+          </a:bodyPr>
           <a:lstStyle/>
           <a:p>
             <a:r>
@@ -4694,10 +4696,9 @@
           </a:p>
           <a:p>
             <a:r>
-              <a:rPr lang="en-US" smtClean="0"/>
+              <a:rPr lang="en-US" dirty="0" smtClean="0"/>
               <a:t>However…</a:t>
             </a:r>
-            <a:endParaRPr lang="en-US" dirty="0" smtClean="0"/>
           </a:p>
           <a:p>
             <a:pPr lvl="1"/>
@@ -4727,23 +4728,7 @@
             </a:r>
             <a:r>
               <a:rPr lang="en-US" dirty="0" smtClean="0"/>
-              <a:t>be optimized for HPC usage</a:t>
-            </a:r>
-            <a:r>
-              <a:rPr lang="en-US" dirty="0" smtClean="0"/>
-              <a:t>! (No </a:t>
-            </a:r>
-            <a:r>
-              <a:rPr lang="en-US" dirty="0" smtClean="0"/>
-              <a:t>hardware-specific builds for critical </a:t>
-            </a:r>
-            <a:r>
-              <a:rPr lang="en-US" dirty="0" smtClean="0"/>
-              <a:t>libraries, e.g</a:t>
-            </a:r>
-            <a:r>
-              <a:rPr lang="en-US" dirty="0" smtClean="0"/>
-              <a:t>., BLAS, </a:t>
+              <a:t>be optimized for HPC usage! (No hardware-specific builds for critical libraries, e.g., BLAS, </a:t>
             </a:r>
             <a:r>
               <a:rPr lang="en-US" dirty="0" err="1" smtClean="0"/>
@@ -4758,9 +4743,36 @@
             <a:pPr lvl="1"/>
             <a:r>
               <a:rPr lang="en-US" dirty="0" smtClean="0"/>
-              <a:t>Depends on Continuum Analytics</a:t>
-            </a:r>
-            <a:endParaRPr lang="nl-BE" dirty="0"/>
+              <a:t>Depends on Continuum </a:t>
+            </a:r>
+            <a:r>
+              <a:rPr lang="en-US" dirty="0" smtClean="0"/>
+              <a:t>Analytics</a:t>
+            </a:r>
+          </a:p>
+          <a:p>
+            <a:pPr lvl="1"/>
+            <a:r>
+              <a:rPr lang="en-US" dirty="0" smtClean="0"/>
+              <a:t>Only use packages when </a:t>
+            </a:r>
+            <a:r>
+              <a:rPr lang="en-US" b="1" dirty="0" smtClean="0">
+                <a:solidFill>
+                  <a:srgbClr val="C00000"/>
+                </a:solidFill>
+              </a:rPr>
+              <a:t>necessary</a:t>
+            </a:r>
+            <a:r>
+              <a:rPr lang="en-US" dirty="0" smtClean="0"/>
+              <a:t>, </a:t>
+            </a:r>
+            <a:r>
+              <a:rPr lang="en-US" i="1" dirty="0" smtClean="0"/>
+              <a:t>or else…</a:t>
+            </a:r>
+            <a:endParaRPr lang="nl-BE" i="1" dirty="0"/>
           </a:p>
         </p:txBody>
       </p:sp>
@@ -4783,6 +4795,56 @@
               <a:rPr lang="nl-BE" smtClean="0"/>
               <a:t>12</a:t>
             </a:fld>
+            <a:endParaRPr lang="nl-BE"/>
+          </a:p>
+        </p:txBody>
+      </p:sp>
+      <p:sp>
+        <p:nvSpPr>
+          <p:cNvPr id="5" name="Rectangle 4"/>
+          <p:cNvSpPr/>
+          <p:nvPr/>
+        </p:nvSpPr>
+        <p:spPr>
+          <a:xfrm>
+            <a:off x="1338943" y="5478235"/>
+            <a:ext cx="5674178" cy="408216"/>
+          </a:xfrm>
+          <a:prstGeom prst="rect">
+            <a:avLst/>
+          </a:prstGeom>
+          <a:solidFill>
+            <a:srgbClr val="FF0000">
+              <a:alpha val="35000"/>
+            </a:srgbClr>
+          </a:solidFill>
+          <a:ln w="19050">
+            <a:solidFill>
+              <a:srgbClr val="FF0000"/>
+            </a:solidFill>
+          </a:ln>
+        </p:spPr>
+        <p:style>
+          <a:lnRef idx="2">
+            <a:schemeClr val="accent1">
+              <a:shade val="50000"/>
+            </a:schemeClr>
+          </a:lnRef>
+          <a:fillRef idx="1">
+            <a:schemeClr val="accent1"/>
+          </a:fillRef>
+          <a:effectRef idx="0">
+            <a:schemeClr val="accent1"/>
+          </a:effectRef>
+          <a:fontRef idx="minor">
+            <a:schemeClr val="lt1"/>
+          </a:fontRef>
+        </p:style>
+        <p:txBody>
+          <a:bodyPr rtlCol="0" anchor="ctr"/>
+          <a:lstStyle/>
+          <a:p>
+            <a:pPr algn="ctr"/>
             <a:endParaRPr lang="nl-BE"/>
           </a:p>
         </p:txBody>
@@ -5249,6 +5311,82 @@
                       </p:childTnLst>
                     </p:cTn>
                   </p:par>
+                  <p:par>
+                    <p:cTn id="39" fill="hold">
+                      <p:stCondLst>
+                        <p:cond delay="indefinite"/>
+                      </p:stCondLst>
+                      <p:childTnLst>
+                        <p:par>
+                          <p:cTn id="40" fill="hold">
+                            <p:stCondLst>
+                              <p:cond delay="0"/>
+                            </p:stCondLst>
+                            <p:childTnLst>
+                              <p:par>
+                                <p:cTn id="41" presetID="1" presetClass="entr" presetSubtype="0" fill="hold" grpId="0" nodeType="clickEffect">
+                                  <p:stCondLst>
+                                    <p:cond delay="0"/>
+                                  </p:stCondLst>
+                                  <p:childTnLst>
+                                    <p:set>
+                                      <p:cBhvr>
+                                        <p:cTn id="42" dur="1" fill="hold">
+                                          <p:stCondLst>
+                                            <p:cond delay="0"/>
+                                          </p:stCondLst>
+                                        </p:cTn>
+                                        <p:tgtEl>
+                                          <p:spTgt spid="3">
+                                            <p:txEl>
+                                              <p:pRg st="9" end="9"/>
+                                            </p:txEl>
+                                          </p:spTgt>
+                                        </p:tgtEl>
+                                        <p:attrNameLst>
+                                          <p:attrName>style.visibility</p:attrName>
+                                        </p:attrNameLst>
+                                      </p:cBhvr>
+                                      <p:to>
+                                        <p:strVal val="visible"/>
+                                      </p:to>
+                                    </p:set>
+                                  </p:childTnLst>
+                                </p:cTn>
+                              </p:par>
+                              <p:par>
+                                <p:cTn id="43" presetID="1" presetClass="entr" presetSubtype="0" fill="hold" grpId="0" nodeType="withEffect">
+                                  <p:stCondLst>
+                                    <p:cond delay="0"/>
+                                  </p:stCondLst>
+                                  <p:childTnLst>
+                                    <p:set>
+                                      <p:cBhvr>
+                                        <p:cTn id="44" dur="1" fill="hold">
+                                          <p:stCondLst>
+                                            <p:cond delay="0"/>
+                                          </p:stCondLst>
+                                        </p:cTn>
+                                        <p:tgtEl>
+                                          <p:spTgt spid="5"/>
+                                        </p:tgtEl>
+                                        <p:attrNameLst>
+                                          <p:attrName>style.visibility</p:attrName>
+                                        </p:attrNameLst>
+                                      </p:cBhvr>
+                                      <p:to>
+                                        <p:strVal val="visible"/>
+                                      </p:to>
+                                    </p:set>
+                                  </p:childTnLst>
+                                </p:cTn>
+                              </p:par>
+                            </p:childTnLst>
+                          </p:cTn>
+                        </p:par>
+                      </p:childTnLst>
+                    </p:cTn>
+                  </p:par>
                 </p:childTnLst>
               </p:cTn>
               <p:prevCondLst>
@@ -5272,6 +5410,7 @@
     </p:tnLst>
     <p:bldLst>
       <p:bldP spid="3" grpId="0" uiExpand="1" build="p" bldLvl="2"/>
+      <p:bldP spid="5" grpId="0" animBg="1"/>
     </p:bldLst>
   </p:timing>
 </p:sld>

</xml_diff>

<commit_message>
Fixed typo in environment export command
</commit_message>
<xml_diff>
--- a/R/Conda/conda.pptx
+++ b/R/Conda/conda.pptx
@@ -7987,14 +7987,7 @@
                 <a:latin typeface="Courier New" panose="02070309020205020404" pitchFamily="49" charset="0"/>
                 <a:cs typeface="Courier New" panose="02070309020205020404" pitchFamily="49" charset="0"/>
               </a:rPr>
-              <a:t>anaconda </a:t>
-            </a:r>
-            <a:r>
-              <a:rPr lang="pt-BR" dirty="0" smtClean="0">
-                <a:latin typeface="Courier New" panose="02070309020205020404" pitchFamily="49" charset="0"/>
-                <a:cs typeface="Courier New" panose="02070309020205020404" pitchFamily="49" charset="0"/>
-              </a:rPr>
-              <a:t>search  --channel r  gsl</a:t>
+              <a:t>anaconda search  --channel r  gsl</a:t>
             </a:r>
             <a:endParaRPr lang="nl-BE" dirty="0">
               <a:latin typeface="Courier New" panose="02070309020205020404" pitchFamily="49" charset="0"/>
@@ -9563,7 +9556,21 @@
                 <a:latin typeface="Courier New" panose="02070309020205020404" pitchFamily="49" charset="0"/>
                 <a:cs typeface="Courier New" panose="02070309020205020404" pitchFamily="49" charset="0"/>
               </a:rPr>
-              <a:t>$ conda env  export  R_base_environment.yml</a:t>
+              <a:t>$ conda env  export </a:t>
+            </a:r>
+            <a:r>
+              <a:rPr lang="pt-BR" dirty="0" smtClean="0">
+                <a:latin typeface="Courier New" panose="02070309020205020404" pitchFamily="49" charset="0"/>
+                <a:cs typeface="Courier New" panose="02070309020205020404" pitchFamily="49" charset="0"/>
+              </a:rPr>
+              <a:t>&gt; </a:t>
+            </a:r>
+            <a:r>
+              <a:rPr lang="pt-BR" dirty="0">
+                <a:latin typeface="Courier New" panose="02070309020205020404" pitchFamily="49" charset="0"/>
+                <a:cs typeface="Courier New" panose="02070309020205020404" pitchFamily="49" charset="0"/>
+              </a:rPr>
+              <a:t>R_base_environment.yml</a:t>
             </a:r>
             <a:endParaRPr lang="nl-BE" dirty="0">
               <a:latin typeface="Courier New" panose="02070309020205020404" pitchFamily="49" charset="0"/>

</xml_diff>